<commit_message>
fixed a centering on ppx
</commit_message>
<xml_diff>
--- a/TDI_finals.pptx
+++ b/TDI_finals.pptx
@@ -3029,8 +3029,8 @@
         </p:nvSpPr>
         <p:spPr>
           <a:xfrm>
-            <a:off x="3538599" y="956912"/>
-            <a:ext cx="5114801" cy="1325563"/>
+            <a:off x="3468459" y="939356"/>
+            <a:ext cx="5255078" cy="1325563"/>
           </a:xfrm>
           <a:prstGeom prst="rect">
             <a:avLst/>
@@ -3060,6 +3060,7 @@
             </a:lvl1pPr>
           </a:lstStyle>
           <a:p>
+            <a:pPr algn="ctr"/>
             <a:r>
               <a:rPr lang="en-US" dirty="0">
                 <a:solidFill>

</xml_diff>